<commit_message>
fix figures in ITI-31
</commit_message>
<xml_diff>
--- a/ITI/TF/Volume2/media/Figure_3.31-2.pptx
+++ b/ITI/TF/Volume2/media/Figure_3.31-2.pptx
@@ -107,6 +107,11 @@
       </a:defRPr>
     </a:lvl9pPr>
   </p:defaultTextStyle>
+  <p:extLst>
+    <p:ext uri="{EFAFB233-063F-42B5-8137-9DF3F51BA10A}">
+      <p15:sldGuideLst xmlns:p15="http://schemas.microsoft.com/office/powerpoint/2012/main"/>
+    </p:ext>
+  </p:extLst>
 </p:presentation>
 </file>
 
@@ -192,7 +197,7 @@
           <a:p>
             <a:fld id="{987A1CB4-2E6D-A645-99D4-EB108D85299E}" type="datetimeFigureOut">
               <a:rPr lang="en-US" smtClean="0"/>
-              <a:t>11/10/20</a:t>
+              <a:t>11/17/2020</a:t>
             </a:fld>
             <a:endParaRPr lang="en-US"/>
           </a:p>
@@ -690,7 +695,7 @@
           <a:p>
             <a:fld id="{B894611B-C464-0944-B506-B291BE1913B1}" type="datetimeFigureOut">
               <a:rPr lang="en-US" smtClean="0"/>
-              <a:t>11/9/20</a:t>
+              <a:t>11/17/2020</a:t>
             </a:fld>
             <a:endParaRPr lang="en-US"/>
           </a:p>
@@ -888,7 +893,7 @@
           <a:p>
             <a:fld id="{B894611B-C464-0944-B506-B291BE1913B1}" type="datetimeFigureOut">
               <a:rPr lang="en-US" smtClean="0"/>
-              <a:t>11/9/20</a:t>
+              <a:t>11/17/2020</a:t>
             </a:fld>
             <a:endParaRPr lang="en-US"/>
           </a:p>
@@ -1096,7 +1101,7 @@
           <a:p>
             <a:fld id="{B894611B-C464-0944-B506-B291BE1913B1}" type="datetimeFigureOut">
               <a:rPr lang="en-US" smtClean="0"/>
-              <a:t>11/9/20</a:t>
+              <a:t>11/17/2020</a:t>
             </a:fld>
             <a:endParaRPr lang="en-US"/>
           </a:p>
@@ -1294,7 +1299,7 @@
           <a:p>
             <a:fld id="{B894611B-C464-0944-B506-B291BE1913B1}" type="datetimeFigureOut">
               <a:rPr lang="en-US" smtClean="0"/>
-              <a:t>11/9/20</a:t>
+              <a:t>11/17/2020</a:t>
             </a:fld>
             <a:endParaRPr lang="en-US"/>
           </a:p>
@@ -1569,7 +1574,7 @@
           <a:p>
             <a:fld id="{B894611B-C464-0944-B506-B291BE1913B1}" type="datetimeFigureOut">
               <a:rPr lang="en-US" smtClean="0"/>
-              <a:t>11/9/20</a:t>
+              <a:t>11/17/2020</a:t>
             </a:fld>
             <a:endParaRPr lang="en-US"/>
           </a:p>
@@ -1834,7 +1839,7 @@
           <a:p>
             <a:fld id="{B894611B-C464-0944-B506-B291BE1913B1}" type="datetimeFigureOut">
               <a:rPr lang="en-US" smtClean="0"/>
-              <a:t>11/9/20</a:t>
+              <a:t>11/17/2020</a:t>
             </a:fld>
             <a:endParaRPr lang="en-US"/>
           </a:p>
@@ -2246,7 +2251,7 @@
           <a:p>
             <a:fld id="{B894611B-C464-0944-B506-B291BE1913B1}" type="datetimeFigureOut">
               <a:rPr lang="en-US" smtClean="0"/>
-              <a:t>11/9/20</a:t>
+              <a:t>11/17/2020</a:t>
             </a:fld>
             <a:endParaRPr lang="en-US"/>
           </a:p>
@@ -2387,7 +2392,7 @@
           <a:p>
             <a:fld id="{B894611B-C464-0944-B506-B291BE1913B1}" type="datetimeFigureOut">
               <a:rPr lang="en-US" smtClean="0"/>
-              <a:t>11/9/20</a:t>
+              <a:t>11/17/2020</a:t>
             </a:fld>
             <a:endParaRPr lang="en-US"/>
           </a:p>
@@ -2500,7 +2505,7 @@
           <a:p>
             <a:fld id="{B894611B-C464-0944-B506-B291BE1913B1}" type="datetimeFigureOut">
               <a:rPr lang="en-US" smtClean="0"/>
-              <a:t>11/9/20</a:t>
+              <a:t>11/17/2020</a:t>
             </a:fld>
             <a:endParaRPr lang="en-US"/>
           </a:p>
@@ -2811,7 +2816,7 @@
           <a:p>
             <a:fld id="{B894611B-C464-0944-B506-B291BE1913B1}" type="datetimeFigureOut">
               <a:rPr lang="en-US" smtClean="0"/>
-              <a:t>11/9/20</a:t>
+              <a:t>11/17/2020</a:t>
             </a:fld>
             <a:endParaRPr lang="en-US"/>
           </a:p>
@@ -3099,7 +3104,7 @@
           <a:p>
             <a:fld id="{B894611B-C464-0944-B506-B291BE1913B1}" type="datetimeFigureOut">
               <a:rPr lang="en-US" smtClean="0"/>
-              <a:t>11/9/20</a:t>
+              <a:t>11/17/2020</a:t>
             </a:fld>
             <a:endParaRPr lang="en-US"/>
           </a:p>
@@ -3340,7 +3345,7 @@
           <a:p>
             <a:fld id="{B894611B-C464-0944-B506-B291BE1913B1}" type="datetimeFigureOut">
               <a:rPr lang="en-US" smtClean="0"/>
-              <a:t>11/9/20</a:t>
+              <a:t>11/17/2020</a:t>
             </a:fld>
             <a:endParaRPr lang="en-US"/>
           </a:p>
@@ -4048,20 +4053,20 @@
           <p:nvPr>
             <p:extLst>
               <p:ext uri="{D42A27DB-BD31-4B8C-83A1-F6EECF244321}">
-                <p14:modId xmlns:p14="http://schemas.microsoft.com/office/powerpoint/2010/main" val="3998523831"/>
+                <p14:modId xmlns:p14="http://schemas.microsoft.com/office/powerpoint/2010/main" val="1231232996"/>
               </p:ext>
             </p:extLst>
           </p:nvPr>
         </p:nvGraphicFramePr>
         <p:xfrm>
-          <a:off x="3778250" y="1366462"/>
-          <a:ext cx="4635500" cy="3492500"/>
+          <a:off x="2300141" y="252817"/>
+          <a:ext cx="8335210" cy="6279953"/>
         </p:xfrm>
         <a:graphic>
           <a:graphicData uri="http://schemas.openxmlformats.org/presentationml/2006/ole">
             <mc:AlternateContent xmlns:mc="http://schemas.openxmlformats.org/markup-compatibility/2006">
               <mc:Choice xmlns:v="urn:schemas-microsoft-com:vml" Requires="v">
-                <p:oleObj spid="_x0000_s1040" r:id="rId4" imgW="4521200" imgH="3390900" progId="PowerPoint.Show.8">
+                <p:oleObj spid="_x0000_s1041" r:id="rId4" imgW="4521200" imgH="3390900" progId="PowerPoint.Show.8">
                   <p:embed/>
                 </p:oleObj>
               </mc:Choice>
@@ -4091,22 +4096,13 @@
                     </p:blipFill>
                     <p:spPr bwMode="auto">
                       <a:xfrm>
-                        <a:off x="3778250" y="1366462"/>
-                        <a:ext cx="4635500" cy="3492500"/>
+                        <a:off x="2300141" y="252817"/>
+                        <a:ext cx="8335210" cy="6279953"/>
                       </a:xfrm>
                       <a:prstGeom prst="rect">
                         <a:avLst/>
                       </a:prstGeom>
                       <a:noFill/>
-                      <a:extLst>
-                        <a:ext uri="{909E8E84-426E-40DD-AFC4-6F175D3DCCD1}">
-                          <a14:hiddenFill xmlns:a14="http://schemas.microsoft.com/office/drawing/2010/main">
-                            <a:solidFill>
-                              <a:srgbClr val="FFFFFF"/>
-                            </a:solidFill>
-                          </a14:hiddenFill>
-                        </a:ext>
-                      </a:extLst>
                     </p:spPr>
                   </p:pic>
                 </p:oleObj>

</xml_diff>